<commit_message>
Added in some of answers
</commit_message>
<xml_diff>
--- a/Jan 2020/lectures/2_types_and_modules.pptx
+++ b/Jan 2020/lectures/2_types_and_modules.pptx
@@ -7182,40 +7182,23 @@
             <p:ph type="title"/>
           </p:nvPr>
         </p:nvSpPr>
-        <p:spPr/>
-        <p:txBody>
-          <a:bodyPr/>
+        <p:spPr>
+          <a:xfrm>
+            <a:off x="838200" y="2391952"/>
+            <a:ext cx="10515600" cy="1325563"/>
+          </a:xfrm>
+        </p:spPr>
+        <p:txBody>
+          <a:bodyPr>
+            <a:normAutofit/>
+          </a:bodyPr>
           <a:lstStyle/>
           <a:p>
             <a:r>
-              <a:rPr lang="en-GB" dirty="0"/>
-              <a:t>Let’s get started with NumPy</a:t>
-            </a:r>
-          </a:p>
-        </p:txBody>
-      </p:sp>
-      <p:sp>
-        <p:nvSpPr>
-          <p:cNvPr id="3" name="Content Placeholder 2">
-            <a:extLst>
-              <a:ext uri="{FF2B5EF4-FFF2-40B4-BE49-F238E27FC236}">
-                <a16:creationId xmlns:a16="http://schemas.microsoft.com/office/drawing/2014/main" id="{EBC47AA4-1648-4E91-A777-721E9817862B}"/>
-              </a:ext>
-            </a:extLst>
-          </p:cNvPr>
-          <p:cNvSpPr>
-            <a:spLocks noGrp="1"/>
-          </p:cNvSpPr>
-          <p:nvPr>
-            <p:ph idx="1"/>
-          </p:nvPr>
-        </p:nvSpPr>
-        <p:spPr/>
-        <p:txBody>
-          <a:bodyPr/>
-          <a:lstStyle/>
-          <a:p>
-            <a:endParaRPr lang="en-GB" dirty="0"/>
+              <a:rPr lang="en-GB" sz="6000" b="1" dirty="0"/>
+              <a:t>https://tinyurl.com/sn-python</a:t>
+            </a:r>
+            <a:endParaRPr lang="en-GB" sz="6000" dirty="0"/>
           </a:p>
         </p:txBody>
       </p:sp>

</xml_diff>